<commit_message>
Thesis and presnetation slides complete.
</commit_message>
<xml_diff>
--- a/doc_thesis/multiplesamples.pptx
+++ b/doc_thesis/multiplesamples.pptx
@@ -288,7 +288,7 @@
           <a:p>
             <a:fld id="{B3DB81E9-DD0C-E44D-8882-765ACBDC94CF}" type="datetimeFigureOut">
               <a:rPr lang="en-US" smtClean="0"/>
-              <a:t>4/7/17</a:t>
+              <a:t>4/30/17</a:t>
             </a:fld>
             <a:endParaRPr lang="en-US"/>
           </a:p>
@@ -458,7 +458,7 @@
           <a:p>
             <a:fld id="{B3DB81E9-DD0C-E44D-8882-765ACBDC94CF}" type="datetimeFigureOut">
               <a:rPr lang="en-US" smtClean="0"/>
-              <a:t>4/7/17</a:t>
+              <a:t>4/30/17</a:t>
             </a:fld>
             <a:endParaRPr lang="en-US"/>
           </a:p>
@@ -638,7 +638,7 @@
           <a:p>
             <a:fld id="{B3DB81E9-DD0C-E44D-8882-765ACBDC94CF}" type="datetimeFigureOut">
               <a:rPr lang="en-US" smtClean="0"/>
-              <a:t>4/7/17</a:t>
+              <a:t>4/30/17</a:t>
             </a:fld>
             <a:endParaRPr lang="en-US"/>
           </a:p>
@@ -808,7 +808,7 @@
           <a:p>
             <a:fld id="{B3DB81E9-DD0C-E44D-8882-765ACBDC94CF}" type="datetimeFigureOut">
               <a:rPr lang="en-US" smtClean="0"/>
-              <a:t>4/7/17</a:t>
+              <a:t>4/30/17</a:t>
             </a:fld>
             <a:endParaRPr lang="en-US"/>
           </a:p>
@@ -1054,7 +1054,7 @@
           <a:p>
             <a:fld id="{B3DB81E9-DD0C-E44D-8882-765ACBDC94CF}" type="datetimeFigureOut">
               <a:rPr lang="en-US" smtClean="0"/>
-              <a:t>4/7/17</a:t>
+              <a:t>4/30/17</a:t>
             </a:fld>
             <a:endParaRPr lang="en-US"/>
           </a:p>
@@ -1342,7 +1342,7 @@
           <a:p>
             <a:fld id="{B3DB81E9-DD0C-E44D-8882-765ACBDC94CF}" type="datetimeFigureOut">
               <a:rPr lang="en-US" smtClean="0"/>
-              <a:t>4/7/17</a:t>
+              <a:t>4/30/17</a:t>
             </a:fld>
             <a:endParaRPr lang="en-US"/>
           </a:p>
@@ -1764,7 +1764,7 @@
           <a:p>
             <a:fld id="{B3DB81E9-DD0C-E44D-8882-765ACBDC94CF}" type="datetimeFigureOut">
               <a:rPr lang="en-US" smtClean="0"/>
-              <a:t>4/7/17</a:t>
+              <a:t>4/30/17</a:t>
             </a:fld>
             <a:endParaRPr lang="en-US"/>
           </a:p>
@@ -1882,7 +1882,7 @@
           <a:p>
             <a:fld id="{B3DB81E9-DD0C-E44D-8882-765ACBDC94CF}" type="datetimeFigureOut">
               <a:rPr lang="en-US" smtClean="0"/>
-              <a:t>4/7/17</a:t>
+              <a:t>4/30/17</a:t>
             </a:fld>
             <a:endParaRPr lang="en-US"/>
           </a:p>
@@ -1977,7 +1977,7 @@
           <a:p>
             <a:fld id="{B3DB81E9-DD0C-E44D-8882-765ACBDC94CF}" type="datetimeFigureOut">
               <a:rPr lang="en-US" smtClean="0"/>
-              <a:t>4/7/17</a:t>
+              <a:t>4/30/17</a:t>
             </a:fld>
             <a:endParaRPr lang="en-US"/>
           </a:p>
@@ -2254,7 +2254,7 @@
           <a:p>
             <a:fld id="{B3DB81E9-DD0C-E44D-8882-765ACBDC94CF}" type="datetimeFigureOut">
               <a:rPr lang="en-US" smtClean="0"/>
-              <a:t>4/7/17</a:t>
+              <a:t>4/30/17</a:t>
             </a:fld>
             <a:endParaRPr lang="en-US"/>
           </a:p>
@@ -2507,7 +2507,7 @@
           <a:p>
             <a:fld id="{B3DB81E9-DD0C-E44D-8882-765ACBDC94CF}" type="datetimeFigureOut">
               <a:rPr lang="en-US" smtClean="0"/>
-              <a:t>4/7/17</a:t>
+              <a:t>4/30/17</a:t>
             </a:fld>
             <a:endParaRPr lang="en-US"/>
           </a:p>
@@ -2720,7 +2720,7 @@
           <a:p>
             <a:fld id="{B3DB81E9-DD0C-E44D-8882-765ACBDC94CF}" type="datetimeFigureOut">
               <a:rPr lang="en-US" smtClean="0"/>
-              <a:t>4/7/17</a:t>
+              <a:t>4/30/17</a:t>
             </a:fld>
             <a:endParaRPr lang="en-US"/>
           </a:p>
@@ -3717,254 +3717,6 @@
         </p:grpSp>
         <p:grpSp>
           <p:nvGrpSpPr>
-            <p:cNvPr id="8" name="Group 7"/>
-            <p:cNvGrpSpPr/>
-            <p:nvPr/>
-          </p:nvGrpSpPr>
-          <p:grpSpPr>
-            <a:xfrm>
-              <a:off x="4725357" y="1336203"/>
-              <a:ext cx="245871" cy="232478"/>
-              <a:chOff x="1573513" y="4577208"/>
-              <a:chExt cx="245871" cy="232478"/>
-            </a:xfrm>
-          </p:grpSpPr>
-          <p:sp>
-            <p:nvSpPr>
-              <p:cNvPr id="87" name="Oval 86"/>
-              <p:cNvSpPr/>
-              <p:nvPr/>
-            </p:nvSpPr>
-            <p:spPr>
-              <a:xfrm>
-                <a:off x="1573513" y="4577208"/>
-                <a:ext cx="245871" cy="232478"/>
-              </a:xfrm>
-              <a:prstGeom prst="ellipse">
-                <a:avLst/>
-              </a:prstGeom>
-              <a:solidFill>
-                <a:srgbClr val="A6A6A6"/>
-              </a:solidFill>
-              <a:ln>
-                <a:solidFill>
-                  <a:schemeClr val="tx1"/>
-                </a:solidFill>
-              </a:ln>
-            </p:spPr>
-            <p:style>
-              <a:lnRef idx="1">
-                <a:schemeClr val="accent1"/>
-              </a:lnRef>
-              <a:fillRef idx="3">
-                <a:schemeClr val="accent1"/>
-              </a:fillRef>
-              <a:effectRef idx="2">
-                <a:schemeClr val="accent1"/>
-              </a:effectRef>
-              <a:fontRef idx="minor">
-                <a:schemeClr val="lt1"/>
-              </a:fontRef>
-            </p:style>
-            <p:txBody>
-              <a:bodyPr rtlCol="0" anchor="ctr"/>
-              <a:lstStyle/>
-              <a:p>
-                <a:pPr algn="ctr"/>
-                <a:endParaRPr lang="en-US"/>
-              </a:p>
-            </p:txBody>
-          </p:sp>
-          <p:sp>
-            <p:nvSpPr>
-              <p:cNvPr id="88" name="Oval 87"/>
-              <p:cNvSpPr/>
-              <p:nvPr/>
-            </p:nvSpPr>
-            <p:spPr>
-              <a:xfrm>
-                <a:off x="1728430" y="4634739"/>
-                <a:ext cx="76305" cy="74636"/>
-              </a:xfrm>
-              <a:prstGeom prst="ellipse">
-                <a:avLst/>
-              </a:prstGeom>
-              <a:solidFill>
-                <a:schemeClr val="tx2">
-                  <a:lumMod val="40000"/>
-                  <a:lumOff val="60000"/>
-                </a:schemeClr>
-              </a:solidFill>
-              <a:ln>
-                <a:solidFill>
-                  <a:srgbClr val="000000"/>
-                </a:solidFill>
-              </a:ln>
-            </p:spPr>
-            <p:style>
-              <a:lnRef idx="1">
-                <a:schemeClr val="accent1"/>
-              </a:lnRef>
-              <a:fillRef idx="3">
-                <a:schemeClr val="accent1"/>
-              </a:fillRef>
-              <a:effectRef idx="2">
-                <a:schemeClr val="accent1"/>
-              </a:effectRef>
-              <a:fontRef idx="minor">
-                <a:schemeClr val="lt1"/>
-              </a:fontRef>
-            </p:style>
-            <p:txBody>
-              <a:bodyPr rtlCol="0" anchor="ctr"/>
-              <a:lstStyle/>
-              <a:p>
-                <a:pPr algn="ctr"/>
-                <a:endParaRPr lang="en-US"/>
-              </a:p>
-            </p:txBody>
-          </p:sp>
-          <p:sp>
-            <p:nvSpPr>
-              <p:cNvPr id="89" name="Oval 88"/>
-              <p:cNvSpPr/>
-              <p:nvPr/>
-            </p:nvSpPr>
-            <p:spPr>
-              <a:xfrm>
-                <a:off x="1698215" y="4708343"/>
-                <a:ext cx="76305" cy="74636"/>
-              </a:xfrm>
-              <a:prstGeom prst="ellipse">
-                <a:avLst/>
-              </a:prstGeom>
-              <a:solidFill>
-                <a:srgbClr val="9BBB59"/>
-              </a:solidFill>
-              <a:ln>
-                <a:solidFill>
-                  <a:srgbClr val="000000"/>
-                </a:solidFill>
-              </a:ln>
-            </p:spPr>
-            <p:style>
-              <a:lnRef idx="1">
-                <a:schemeClr val="accent1"/>
-              </a:lnRef>
-              <a:fillRef idx="3">
-                <a:schemeClr val="accent1"/>
-              </a:fillRef>
-              <a:effectRef idx="2">
-                <a:schemeClr val="accent1"/>
-              </a:effectRef>
-              <a:fontRef idx="minor">
-                <a:schemeClr val="lt1"/>
-              </a:fontRef>
-            </p:style>
-            <p:txBody>
-              <a:bodyPr rtlCol="0" anchor="ctr"/>
-              <a:lstStyle/>
-              <a:p>
-                <a:pPr algn="ctr"/>
-                <a:endParaRPr lang="en-US"/>
-              </a:p>
-            </p:txBody>
-          </p:sp>
-          <p:sp>
-            <p:nvSpPr>
-              <p:cNvPr id="90" name="Oval 89"/>
-              <p:cNvSpPr/>
-              <p:nvPr/>
-            </p:nvSpPr>
-            <p:spPr>
-              <a:xfrm>
-                <a:off x="1666462" y="4581148"/>
-                <a:ext cx="76305" cy="74636"/>
-              </a:xfrm>
-              <a:prstGeom prst="ellipse">
-                <a:avLst/>
-              </a:prstGeom>
-              <a:solidFill>
-                <a:srgbClr val="3366FF"/>
-              </a:solidFill>
-              <a:ln>
-                <a:solidFill>
-                  <a:srgbClr val="000000"/>
-                </a:solidFill>
-              </a:ln>
-            </p:spPr>
-            <p:style>
-              <a:lnRef idx="1">
-                <a:schemeClr val="accent1"/>
-              </a:lnRef>
-              <a:fillRef idx="3">
-                <a:schemeClr val="accent1"/>
-              </a:fillRef>
-              <a:effectRef idx="2">
-                <a:schemeClr val="accent1"/>
-              </a:effectRef>
-              <a:fontRef idx="minor">
-                <a:schemeClr val="lt1"/>
-              </a:fontRef>
-            </p:style>
-            <p:txBody>
-              <a:bodyPr rtlCol="0" anchor="ctr"/>
-              <a:lstStyle/>
-              <a:p>
-                <a:pPr algn="ctr"/>
-                <a:endParaRPr lang="en-US"/>
-              </a:p>
-            </p:txBody>
-          </p:sp>
-          <p:sp>
-            <p:nvSpPr>
-              <p:cNvPr id="91" name="Oval 90"/>
-              <p:cNvSpPr/>
-              <p:nvPr/>
-            </p:nvSpPr>
-            <p:spPr>
-              <a:xfrm>
-                <a:off x="1589956" y="4617062"/>
-                <a:ext cx="76305" cy="74636"/>
-              </a:xfrm>
-              <a:prstGeom prst="ellipse">
-                <a:avLst/>
-              </a:prstGeom>
-              <a:solidFill>
-                <a:schemeClr val="bg1"/>
-              </a:solidFill>
-              <a:ln>
-                <a:solidFill>
-                  <a:schemeClr val="tx1"/>
-                </a:solidFill>
-              </a:ln>
-            </p:spPr>
-            <p:style>
-              <a:lnRef idx="1">
-                <a:schemeClr val="accent1"/>
-              </a:lnRef>
-              <a:fillRef idx="3">
-                <a:schemeClr val="accent1"/>
-              </a:fillRef>
-              <a:effectRef idx="2">
-                <a:schemeClr val="accent1"/>
-              </a:effectRef>
-              <a:fontRef idx="minor">
-                <a:schemeClr val="lt1"/>
-              </a:fontRef>
-            </p:style>
-            <p:txBody>
-              <a:bodyPr rtlCol="0" anchor="ctr"/>
-              <a:lstStyle/>
-              <a:p>
-                <a:pPr algn="ctr"/>
-                <a:endParaRPr lang="en-US"/>
-              </a:p>
-            </p:txBody>
-          </p:sp>
-        </p:grpSp>
-        <p:grpSp>
-          <p:nvGrpSpPr>
             <p:cNvPr id="9" name="Group 8"/>
             <p:cNvGrpSpPr/>
             <p:nvPr/>
@@ -5251,54 +5003,6 @@
             </p:txBody>
           </p:sp>
         </p:grpSp>
-        <p:sp>
-          <p:nvSpPr>
-            <p:cNvPr id="14" name="Oval 13"/>
-            <p:cNvSpPr/>
-            <p:nvPr/>
-          </p:nvSpPr>
-          <p:spPr>
-            <a:xfrm>
-              <a:off x="4105911" y="1422235"/>
-              <a:ext cx="245872" cy="237675"/>
-            </a:xfrm>
-            <a:prstGeom prst="ellipse">
-              <a:avLst/>
-            </a:prstGeom>
-            <a:solidFill>
-              <a:schemeClr val="bg1">
-                <a:lumMod val="65000"/>
-              </a:schemeClr>
-            </a:solidFill>
-            <a:ln>
-              <a:solidFill>
-                <a:schemeClr val="tx1"/>
-              </a:solidFill>
-            </a:ln>
-          </p:spPr>
-          <p:style>
-            <a:lnRef idx="1">
-              <a:schemeClr val="accent1"/>
-            </a:lnRef>
-            <a:fillRef idx="3">
-              <a:schemeClr val="accent1"/>
-            </a:fillRef>
-            <a:effectRef idx="2">
-              <a:schemeClr val="accent1"/>
-            </a:effectRef>
-            <a:fontRef idx="minor">
-              <a:schemeClr val="lt1"/>
-            </a:fontRef>
-          </p:style>
-          <p:txBody>
-            <a:bodyPr rtlCol="0" anchor="ctr"/>
-            <a:lstStyle/>
-            <a:p>
-              <a:pPr algn="ctr"/>
-              <a:endParaRPr lang="en-US"/>
-            </a:p>
-          </p:txBody>
-        </p:sp>
         <p:grpSp>
           <p:nvGrpSpPr>
             <p:cNvPr id="15" name="Group 14"/>
@@ -5795,102 +5499,6 @@
             </p:txBody>
           </p:sp>
         </p:grpSp>
-        <p:sp>
-          <p:nvSpPr>
-            <p:cNvPr id="17" name="Oval 16"/>
-            <p:cNvSpPr/>
-            <p:nvPr/>
-          </p:nvSpPr>
-          <p:spPr>
-            <a:xfrm>
-              <a:off x="4594348" y="1040623"/>
-              <a:ext cx="245872" cy="237675"/>
-            </a:xfrm>
-            <a:prstGeom prst="ellipse">
-              <a:avLst/>
-            </a:prstGeom>
-            <a:solidFill>
-              <a:schemeClr val="bg1">
-                <a:lumMod val="65000"/>
-              </a:schemeClr>
-            </a:solidFill>
-            <a:ln>
-              <a:solidFill>
-                <a:schemeClr val="tx1"/>
-              </a:solidFill>
-            </a:ln>
-          </p:spPr>
-          <p:style>
-            <a:lnRef idx="1">
-              <a:schemeClr val="accent1"/>
-            </a:lnRef>
-            <a:fillRef idx="3">
-              <a:schemeClr val="accent1"/>
-            </a:fillRef>
-            <a:effectRef idx="2">
-              <a:schemeClr val="accent1"/>
-            </a:effectRef>
-            <a:fontRef idx="minor">
-              <a:schemeClr val="lt1"/>
-            </a:fontRef>
-          </p:style>
-          <p:txBody>
-            <a:bodyPr rtlCol="0" anchor="ctr"/>
-            <a:lstStyle/>
-            <a:p>
-              <a:pPr algn="ctr"/>
-              <a:endParaRPr lang="en-US"/>
-            </a:p>
-          </p:txBody>
-        </p:sp>
-        <p:sp>
-          <p:nvSpPr>
-            <p:cNvPr id="18" name="Oval 17"/>
-            <p:cNvSpPr/>
-            <p:nvPr/>
-          </p:nvSpPr>
-          <p:spPr>
-            <a:xfrm>
-              <a:off x="5110921" y="838982"/>
-              <a:ext cx="245872" cy="237675"/>
-            </a:xfrm>
-            <a:prstGeom prst="ellipse">
-              <a:avLst/>
-            </a:prstGeom>
-            <a:solidFill>
-              <a:schemeClr val="bg1">
-                <a:lumMod val="65000"/>
-              </a:schemeClr>
-            </a:solidFill>
-            <a:ln>
-              <a:solidFill>
-                <a:schemeClr val="tx1"/>
-              </a:solidFill>
-            </a:ln>
-          </p:spPr>
-          <p:style>
-            <a:lnRef idx="1">
-              <a:schemeClr val="accent1"/>
-            </a:lnRef>
-            <a:fillRef idx="3">
-              <a:schemeClr val="accent1"/>
-            </a:fillRef>
-            <a:effectRef idx="2">
-              <a:schemeClr val="accent1"/>
-            </a:effectRef>
-            <a:fontRef idx="minor">
-              <a:schemeClr val="lt1"/>
-            </a:fontRef>
-          </p:style>
-          <p:txBody>
-            <a:bodyPr rtlCol="0" anchor="ctr"/>
-            <a:lstStyle/>
-            <a:p>
-              <a:pPr algn="ctr"/>
-              <a:endParaRPr lang="en-US"/>
-            </a:p>
-          </p:txBody>
-        </p:sp>
         <p:grpSp>
           <p:nvGrpSpPr>
             <p:cNvPr id="19" name="Group 18"/>
@@ -6187,54 +5795,6 @@
             </p:txBody>
           </p:sp>
         </p:grpSp>
-        <p:sp>
-          <p:nvSpPr>
-            <p:cNvPr id="20" name="Oval 19"/>
-            <p:cNvSpPr/>
-            <p:nvPr/>
-          </p:nvSpPr>
-          <p:spPr>
-            <a:xfrm>
-              <a:off x="4679199" y="1755032"/>
-              <a:ext cx="245872" cy="237675"/>
-            </a:xfrm>
-            <a:prstGeom prst="ellipse">
-              <a:avLst/>
-            </a:prstGeom>
-            <a:solidFill>
-              <a:schemeClr val="bg1">
-                <a:lumMod val="65000"/>
-              </a:schemeClr>
-            </a:solidFill>
-            <a:ln>
-              <a:solidFill>
-                <a:schemeClr val="tx1"/>
-              </a:solidFill>
-            </a:ln>
-          </p:spPr>
-          <p:style>
-            <a:lnRef idx="1">
-              <a:schemeClr val="accent1"/>
-            </a:lnRef>
-            <a:fillRef idx="3">
-              <a:schemeClr val="accent1"/>
-            </a:fillRef>
-            <a:effectRef idx="2">
-              <a:schemeClr val="accent1"/>
-            </a:effectRef>
-            <a:fontRef idx="minor">
-              <a:schemeClr val="lt1"/>
-            </a:fontRef>
-          </p:style>
-          <p:txBody>
-            <a:bodyPr rtlCol="0" anchor="ctr"/>
-            <a:lstStyle/>
-            <a:p>
-              <a:pPr algn="ctr"/>
-              <a:endParaRPr lang="en-US"/>
-            </a:p>
-          </p:txBody>
-        </p:sp>
         <p:sp>
           <p:nvSpPr>
             <p:cNvPr id="21" name="Oval 20"/>
@@ -7153,6 +6713,1342 @@
               <a:schemeClr val="bg1">
                 <a:lumMod val="65000"/>
               </a:schemeClr>
+            </a:solidFill>
+            <a:ln>
+              <a:solidFill>
+                <a:schemeClr val="tx1"/>
+              </a:solidFill>
+            </a:ln>
+          </p:spPr>
+          <p:style>
+            <a:lnRef idx="1">
+              <a:schemeClr val="accent1"/>
+            </a:lnRef>
+            <a:fillRef idx="3">
+              <a:schemeClr val="accent1"/>
+            </a:fillRef>
+            <a:effectRef idx="2">
+              <a:schemeClr val="accent1"/>
+            </a:effectRef>
+            <a:fontRef idx="minor">
+              <a:schemeClr val="lt1"/>
+            </a:fontRef>
+          </p:style>
+          <p:txBody>
+            <a:bodyPr rtlCol="0" anchor="ctr"/>
+            <a:lstStyle/>
+            <a:p>
+              <a:pPr algn="ctr"/>
+              <a:endParaRPr lang="en-US"/>
+            </a:p>
+          </p:txBody>
+        </p:sp>
+      </p:grpSp>
+      <p:grpSp>
+        <p:nvGrpSpPr>
+          <p:cNvPr id="2" name="Group 1"/>
+          <p:cNvGrpSpPr/>
+          <p:nvPr/>
+        </p:nvGrpSpPr>
+        <p:grpSpPr>
+          <a:xfrm>
+            <a:off x="5038456" y="2654813"/>
+            <a:ext cx="380237" cy="359525"/>
+            <a:chOff x="4305201" y="1874607"/>
+            <a:chExt cx="380237" cy="359525"/>
+          </a:xfrm>
+        </p:grpSpPr>
+        <p:sp>
+          <p:nvSpPr>
+            <p:cNvPr id="105" name="Oval 104"/>
+            <p:cNvSpPr/>
+            <p:nvPr/>
+          </p:nvSpPr>
+          <p:spPr>
+            <a:xfrm>
+              <a:off x="4305201" y="1874607"/>
+              <a:ext cx="380237" cy="359525"/>
+            </a:xfrm>
+            <a:prstGeom prst="ellipse">
+              <a:avLst/>
+            </a:prstGeom>
+            <a:solidFill>
+              <a:srgbClr val="A6A6A6"/>
+            </a:solidFill>
+            <a:ln>
+              <a:solidFill>
+                <a:schemeClr val="tx1"/>
+              </a:solidFill>
+            </a:ln>
+          </p:spPr>
+          <p:style>
+            <a:lnRef idx="1">
+              <a:schemeClr val="accent1"/>
+            </a:lnRef>
+            <a:fillRef idx="3">
+              <a:schemeClr val="accent1"/>
+            </a:fillRef>
+            <a:effectRef idx="2">
+              <a:schemeClr val="accent1"/>
+            </a:effectRef>
+            <a:fontRef idx="minor">
+              <a:schemeClr val="lt1"/>
+            </a:fontRef>
+          </p:style>
+          <p:txBody>
+            <a:bodyPr rtlCol="0" anchor="ctr"/>
+            <a:lstStyle/>
+            <a:p>
+              <a:pPr algn="ctr"/>
+              <a:endParaRPr lang="en-US"/>
+            </a:p>
+          </p:txBody>
+        </p:sp>
+        <p:sp>
+          <p:nvSpPr>
+            <p:cNvPr id="106" name="Oval 105"/>
+            <p:cNvSpPr/>
+            <p:nvPr/>
+          </p:nvSpPr>
+          <p:spPr>
+            <a:xfrm>
+              <a:off x="4544779" y="1963578"/>
+              <a:ext cx="118005" cy="115424"/>
+            </a:xfrm>
+            <a:prstGeom prst="ellipse">
+              <a:avLst/>
+            </a:prstGeom>
+            <a:solidFill>
+              <a:schemeClr val="tx2">
+                <a:lumMod val="40000"/>
+                <a:lumOff val="60000"/>
+              </a:schemeClr>
+            </a:solidFill>
+            <a:ln>
+              <a:solidFill>
+                <a:srgbClr val="000000"/>
+              </a:solidFill>
+            </a:ln>
+          </p:spPr>
+          <p:style>
+            <a:lnRef idx="1">
+              <a:schemeClr val="accent1"/>
+            </a:lnRef>
+            <a:fillRef idx="3">
+              <a:schemeClr val="accent1"/>
+            </a:fillRef>
+            <a:effectRef idx="2">
+              <a:schemeClr val="accent1"/>
+            </a:effectRef>
+            <a:fontRef idx="minor">
+              <a:schemeClr val="lt1"/>
+            </a:fontRef>
+          </p:style>
+          <p:txBody>
+            <a:bodyPr rtlCol="0" anchor="ctr"/>
+            <a:lstStyle/>
+            <a:p>
+              <a:pPr algn="ctr"/>
+              <a:endParaRPr lang="en-US"/>
+            </a:p>
+          </p:txBody>
+        </p:sp>
+        <p:sp>
+          <p:nvSpPr>
+            <p:cNvPr id="107" name="Oval 106"/>
+            <p:cNvSpPr/>
+            <p:nvPr/>
+          </p:nvSpPr>
+          <p:spPr>
+            <a:xfrm>
+              <a:off x="4498051" y="2077406"/>
+              <a:ext cx="118005" cy="115424"/>
+            </a:xfrm>
+            <a:prstGeom prst="ellipse">
+              <a:avLst/>
+            </a:prstGeom>
+            <a:solidFill>
+              <a:schemeClr val="accent3"/>
+            </a:solidFill>
+            <a:ln>
+              <a:solidFill>
+                <a:srgbClr val="000000"/>
+              </a:solidFill>
+            </a:ln>
+          </p:spPr>
+          <p:style>
+            <a:lnRef idx="1">
+              <a:schemeClr val="accent1"/>
+            </a:lnRef>
+            <a:fillRef idx="3">
+              <a:schemeClr val="accent1"/>
+            </a:fillRef>
+            <a:effectRef idx="2">
+              <a:schemeClr val="accent1"/>
+            </a:effectRef>
+            <a:fontRef idx="minor">
+              <a:schemeClr val="lt1"/>
+            </a:fontRef>
+          </p:style>
+          <p:txBody>
+            <a:bodyPr rtlCol="0" anchor="ctr"/>
+            <a:lstStyle/>
+            <a:p>
+              <a:pPr algn="ctr"/>
+              <a:endParaRPr lang="en-US"/>
+            </a:p>
+          </p:txBody>
+        </p:sp>
+        <p:sp>
+          <p:nvSpPr>
+            <p:cNvPr id="108" name="Oval 107"/>
+            <p:cNvSpPr/>
+            <p:nvPr/>
+          </p:nvSpPr>
+          <p:spPr>
+            <a:xfrm>
+              <a:off x="4448946" y="1880700"/>
+              <a:ext cx="118005" cy="115424"/>
+            </a:xfrm>
+            <a:prstGeom prst="ellipse">
+              <a:avLst/>
+            </a:prstGeom>
+            <a:solidFill>
+              <a:schemeClr val="accent4"/>
+            </a:solidFill>
+            <a:ln>
+              <a:solidFill>
+                <a:srgbClr val="000000"/>
+              </a:solidFill>
+            </a:ln>
+          </p:spPr>
+          <p:style>
+            <a:lnRef idx="1">
+              <a:schemeClr val="accent1"/>
+            </a:lnRef>
+            <a:fillRef idx="3">
+              <a:schemeClr val="accent1"/>
+            </a:fillRef>
+            <a:effectRef idx="2">
+              <a:schemeClr val="accent1"/>
+            </a:effectRef>
+            <a:fontRef idx="minor">
+              <a:schemeClr val="lt1"/>
+            </a:fontRef>
+          </p:style>
+          <p:txBody>
+            <a:bodyPr rtlCol="0" anchor="ctr"/>
+            <a:lstStyle/>
+            <a:p>
+              <a:pPr algn="ctr"/>
+              <a:endParaRPr lang="en-US"/>
+            </a:p>
+          </p:txBody>
+        </p:sp>
+        <p:sp>
+          <p:nvSpPr>
+            <p:cNvPr id="109" name="Oval 108"/>
+            <p:cNvSpPr/>
+            <p:nvPr/>
+          </p:nvSpPr>
+          <p:spPr>
+            <a:xfrm>
+              <a:off x="4330630" y="1936241"/>
+              <a:ext cx="118005" cy="115424"/>
+            </a:xfrm>
+            <a:prstGeom prst="ellipse">
+              <a:avLst/>
+            </a:prstGeom>
+            <a:solidFill>
+              <a:schemeClr val="bg1"/>
+            </a:solidFill>
+            <a:ln>
+              <a:solidFill>
+                <a:schemeClr val="tx1"/>
+              </a:solidFill>
+            </a:ln>
+          </p:spPr>
+          <p:style>
+            <a:lnRef idx="1">
+              <a:schemeClr val="accent1"/>
+            </a:lnRef>
+            <a:fillRef idx="3">
+              <a:schemeClr val="accent1"/>
+            </a:fillRef>
+            <a:effectRef idx="2">
+              <a:schemeClr val="accent1"/>
+            </a:effectRef>
+            <a:fontRef idx="minor">
+              <a:schemeClr val="lt1"/>
+            </a:fontRef>
+          </p:style>
+          <p:txBody>
+            <a:bodyPr rtlCol="0" anchor="ctr"/>
+            <a:lstStyle/>
+            <a:p>
+              <a:pPr algn="ctr"/>
+              <a:endParaRPr lang="en-US"/>
+            </a:p>
+          </p:txBody>
+        </p:sp>
+      </p:grpSp>
+      <p:grpSp>
+        <p:nvGrpSpPr>
+          <p:cNvPr id="3" name="Group 2"/>
+          <p:cNvGrpSpPr/>
+          <p:nvPr/>
+        </p:nvGrpSpPr>
+        <p:grpSpPr>
+          <a:xfrm>
+            <a:off x="4897797" y="1627418"/>
+            <a:ext cx="380237" cy="359525"/>
+            <a:chOff x="4305201" y="1874607"/>
+            <a:chExt cx="380237" cy="359525"/>
+          </a:xfrm>
+        </p:grpSpPr>
+        <p:sp>
+          <p:nvSpPr>
+            <p:cNvPr id="110" name="Oval 109"/>
+            <p:cNvSpPr/>
+            <p:nvPr/>
+          </p:nvSpPr>
+          <p:spPr>
+            <a:xfrm>
+              <a:off x="4305201" y="1874607"/>
+              <a:ext cx="380237" cy="359525"/>
+            </a:xfrm>
+            <a:prstGeom prst="ellipse">
+              <a:avLst/>
+            </a:prstGeom>
+            <a:solidFill>
+              <a:srgbClr val="A6A6A6"/>
+            </a:solidFill>
+            <a:ln>
+              <a:solidFill>
+                <a:schemeClr val="tx1"/>
+              </a:solidFill>
+            </a:ln>
+          </p:spPr>
+          <p:style>
+            <a:lnRef idx="1">
+              <a:schemeClr val="accent1"/>
+            </a:lnRef>
+            <a:fillRef idx="3">
+              <a:schemeClr val="accent1"/>
+            </a:fillRef>
+            <a:effectRef idx="2">
+              <a:schemeClr val="accent1"/>
+            </a:effectRef>
+            <a:fontRef idx="minor">
+              <a:schemeClr val="lt1"/>
+            </a:fontRef>
+          </p:style>
+          <p:txBody>
+            <a:bodyPr rtlCol="0" anchor="ctr"/>
+            <a:lstStyle/>
+            <a:p>
+              <a:pPr algn="ctr"/>
+              <a:endParaRPr lang="en-US"/>
+            </a:p>
+          </p:txBody>
+        </p:sp>
+        <p:sp>
+          <p:nvSpPr>
+            <p:cNvPr id="111" name="Oval 110"/>
+            <p:cNvSpPr/>
+            <p:nvPr/>
+          </p:nvSpPr>
+          <p:spPr>
+            <a:xfrm>
+              <a:off x="4544779" y="1963578"/>
+              <a:ext cx="118005" cy="115424"/>
+            </a:xfrm>
+            <a:prstGeom prst="ellipse">
+              <a:avLst/>
+            </a:prstGeom>
+            <a:solidFill>
+              <a:schemeClr val="tx2">
+                <a:lumMod val="40000"/>
+                <a:lumOff val="60000"/>
+              </a:schemeClr>
+            </a:solidFill>
+            <a:ln>
+              <a:solidFill>
+                <a:srgbClr val="000000"/>
+              </a:solidFill>
+            </a:ln>
+          </p:spPr>
+          <p:style>
+            <a:lnRef idx="1">
+              <a:schemeClr val="accent1"/>
+            </a:lnRef>
+            <a:fillRef idx="3">
+              <a:schemeClr val="accent1"/>
+            </a:fillRef>
+            <a:effectRef idx="2">
+              <a:schemeClr val="accent1"/>
+            </a:effectRef>
+            <a:fontRef idx="minor">
+              <a:schemeClr val="lt1"/>
+            </a:fontRef>
+          </p:style>
+          <p:txBody>
+            <a:bodyPr rtlCol="0" anchor="ctr"/>
+            <a:lstStyle/>
+            <a:p>
+              <a:pPr algn="ctr"/>
+              <a:endParaRPr lang="en-US"/>
+            </a:p>
+          </p:txBody>
+        </p:sp>
+        <p:sp>
+          <p:nvSpPr>
+            <p:cNvPr id="112" name="Oval 111"/>
+            <p:cNvSpPr/>
+            <p:nvPr/>
+          </p:nvSpPr>
+          <p:spPr>
+            <a:xfrm>
+              <a:off x="4498051" y="2077406"/>
+              <a:ext cx="118005" cy="115424"/>
+            </a:xfrm>
+            <a:prstGeom prst="ellipse">
+              <a:avLst/>
+            </a:prstGeom>
+            <a:solidFill>
+              <a:schemeClr val="accent3"/>
+            </a:solidFill>
+            <a:ln>
+              <a:solidFill>
+                <a:srgbClr val="000000"/>
+              </a:solidFill>
+            </a:ln>
+          </p:spPr>
+          <p:style>
+            <a:lnRef idx="1">
+              <a:schemeClr val="accent1"/>
+            </a:lnRef>
+            <a:fillRef idx="3">
+              <a:schemeClr val="accent1"/>
+            </a:fillRef>
+            <a:effectRef idx="2">
+              <a:schemeClr val="accent1"/>
+            </a:effectRef>
+            <a:fontRef idx="minor">
+              <a:schemeClr val="lt1"/>
+            </a:fontRef>
+          </p:style>
+          <p:txBody>
+            <a:bodyPr rtlCol="0" anchor="ctr"/>
+            <a:lstStyle/>
+            <a:p>
+              <a:pPr algn="ctr"/>
+              <a:endParaRPr lang="en-US"/>
+            </a:p>
+          </p:txBody>
+        </p:sp>
+        <p:sp>
+          <p:nvSpPr>
+            <p:cNvPr id="113" name="Oval 112"/>
+            <p:cNvSpPr/>
+            <p:nvPr/>
+          </p:nvSpPr>
+          <p:spPr>
+            <a:xfrm>
+              <a:off x="4448946" y="1880700"/>
+              <a:ext cx="118005" cy="115424"/>
+            </a:xfrm>
+            <a:prstGeom prst="ellipse">
+              <a:avLst/>
+            </a:prstGeom>
+            <a:solidFill>
+              <a:schemeClr val="accent4"/>
+            </a:solidFill>
+            <a:ln>
+              <a:solidFill>
+                <a:srgbClr val="000000"/>
+              </a:solidFill>
+            </a:ln>
+          </p:spPr>
+          <p:style>
+            <a:lnRef idx="1">
+              <a:schemeClr val="accent1"/>
+            </a:lnRef>
+            <a:fillRef idx="3">
+              <a:schemeClr val="accent1"/>
+            </a:fillRef>
+            <a:effectRef idx="2">
+              <a:schemeClr val="accent1"/>
+            </a:effectRef>
+            <a:fontRef idx="minor">
+              <a:schemeClr val="lt1"/>
+            </a:fontRef>
+          </p:style>
+          <p:txBody>
+            <a:bodyPr rtlCol="0" anchor="ctr"/>
+            <a:lstStyle/>
+            <a:p>
+              <a:pPr algn="ctr"/>
+              <a:endParaRPr lang="en-US"/>
+            </a:p>
+          </p:txBody>
+        </p:sp>
+        <p:sp>
+          <p:nvSpPr>
+            <p:cNvPr id="114" name="Oval 113"/>
+            <p:cNvSpPr/>
+            <p:nvPr/>
+          </p:nvSpPr>
+          <p:spPr>
+            <a:xfrm>
+              <a:off x="4330630" y="1936241"/>
+              <a:ext cx="118005" cy="115424"/>
+            </a:xfrm>
+            <a:prstGeom prst="ellipse">
+              <a:avLst/>
+            </a:prstGeom>
+            <a:solidFill>
+              <a:schemeClr val="bg1"/>
+            </a:solidFill>
+            <a:ln>
+              <a:solidFill>
+                <a:schemeClr val="tx1"/>
+              </a:solidFill>
+            </a:ln>
+          </p:spPr>
+          <p:style>
+            <a:lnRef idx="1">
+              <a:schemeClr val="accent1"/>
+            </a:lnRef>
+            <a:fillRef idx="3">
+              <a:schemeClr val="accent1"/>
+            </a:fillRef>
+            <a:effectRef idx="2">
+              <a:schemeClr val="accent1"/>
+            </a:effectRef>
+            <a:fontRef idx="minor">
+              <a:schemeClr val="lt1"/>
+            </a:fontRef>
+          </p:style>
+          <p:txBody>
+            <a:bodyPr rtlCol="0" anchor="ctr"/>
+            <a:lstStyle/>
+            <a:p>
+              <a:pPr algn="ctr"/>
+              <a:endParaRPr lang="en-US"/>
+            </a:p>
+          </p:txBody>
+        </p:sp>
+      </p:grpSp>
+      <p:grpSp>
+        <p:nvGrpSpPr>
+          <p:cNvPr id="31" name="Group 30"/>
+          <p:cNvGrpSpPr/>
+          <p:nvPr/>
+        </p:nvGrpSpPr>
+        <p:grpSpPr>
+          <a:xfrm>
+            <a:off x="5672833" y="1326143"/>
+            <a:ext cx="380237" cy="359525"/>
+            <a:chOff x="4305201" y="1874607"/>
+            <a:chExt cx="380237" cy="359525"/>
+          </a:xfrm>
+        </p:grpSpPr>
+        <p:sp>
+          <p:nvSpPr>
+            <p:cNvPr id="115" name="Oval 114"/>
+            <p:cNvSpPr/>
+            <p:nvPr/>
+          </p:nvSpPr>
+          <p:spPr>
+            <a:xfrm>
+              <a:off x="4305201" y="1874607"/>
+              <a:ext cx="380237" cy="359525"/>
+            </a:xfrm>
+            <a:prstGeom prst="ellipse">
+              <a:avLst/>
+            </a:prstGeom>
+            <a:solidFill>
+              <a:srgbClr val="A6A6A6"/>
+            </a:solidFill>
+            <a:ln>
+              <a:solidFill>
+                <a:schemeClr val="tx1"/>
+              </a:solidFill>
+            </a:ln>
+          </p:spPr>
+          <p:style>
+            <a:lnRef idx="1">
+              <a:schemeClr val="accent1"/>
+            </a:lnRef>
+            <a:fillRef idx="3">
+              <a:schemeClr val="accent1"/>
+            </a:fillRef>
+            <a:effectRef idx="2">
+              <a:schemeClr val="accent1"/>
+            </a:effectRef>
+            <a:fontRef idx="minor">
+              <a:schemeClr val="lt1"/>
+            </a:fontRef>
+          </p:style>
+          <p:txBody>
+            <a:bodyPr rtlCol="0" anchor="ctr"/>
+            <a:lstStyle/>
+            <a:p>
+              <a:pPr algn="ctr"/>
+              <a:endParaRPr lang="en-US"/>
+            </a:p>
+          </p:txBody>
+        </p:sp>
+        <p:sp>
+          <p:nvSpPr>
+            <p:cNvPr id="116" name="Oval 115"/>
+            <p:cNvSpPr/>
+            <p:nvPr/>
+          </p:nvSpPr>
+          <p:spPr>
+            <a:xfrm>
+              <a:off x="4544779" y="1963578"/>
+              <a:ext cx="118005" cy="115424"/>
+            </a:xfrm>
+            <a:prstGeom prst="ellipse">
+              <a:avLst/>
+            </a:prstGeom>
+            <a:solidFill>
+              <a:schemeClr val="tx2">
+                <a:lumMod val="40000"/>
+                <a:lumOff val="60000"/>
+              </a:schemeClr>
+            </a:solidFill>
+            <a:ln>
+              <a:solidFill>
+                <a:srgbClr val="000000"/>
+              </a:solidFill>
+            </a:ln>
+          </p:spPr>
+          <p:style>
+            <a:lnRef idx="1">
+              <a:schemeClr val="accent1"/>
+            </a:lnRef>
+            <a:fillRef idx="3">
+              <a:schemeClr val="accent1"/>
+            </a:fillRef>
+            <a:effectRef idx="2">
+              <a:schemeClr val="accent1"/>
+            </a:effectRef>
+            <a:fontRef idx="minor">
+              <a:schemeClr val="lt1"/>
+            </a:fontRef>
+          </p:style>
+          <p:txBody>
+            <a:bodyPr rtlCol="0" anchor="ctr"/>
+            <a:lstStyle/>
+            <a:p>
+              <a:pPr algn="ctr"/>
+              <a:endParaRPr lang="en-US"/>
+            </a:p>
+          </p:txBody>
+        </p:sp>
+        <p:sp>
+          <p:nvSpPr>
+            <p:cNvPr id="117" name="Oval 116"/>
+            <p:cNvSpPr/>
+            <p:nvPr/>
+          </p:nvSpPr>
+          <p:spPr>
+            <a:xfrm>
+              <a:off x="4498051" y="2077406"/>
+              <a:ext cx="118005" cy="115424"/>
+            </a:xfrm>
+            <a:prstGeom prst="ellipse">
+              <a:avLst/>
+            </a:prstGeom>
+            <a:solidFill>
+              <a:schemeClr val="accent3"/>
+            </a:solidFill>
+            <a:ln>
+              <a:solidFill>
+                <a:srgbClr val="000000"/>
+              </a:solidFill>
+            </a:ln>
+          </p:spPr>
+          <p:style>
+            <a:lnRef idx="1">
+              <a:schemeClr val="accent1"/>
+            </a:lnRef>
+            <a:fillRef idx="3">
+              <a:schemeClr val="accent1"/>
+            </a:fillRef>
+            <a:effectRef idx="2">
+              <a:schemeClr val="accent1"/>
+            </a:effectRef>
+            <a:fontRef idx="minor">
+              <a:schemeClr val="lt1"/>
+            </a:fontRef>
+          </p:style>
+          <p:txBody>
+            <a:bodyPr rtlCol="0" anchor="ctr"/>
+            <a:lstStyle/>
+            <a:p>
+              <a:pPr algn="ctr"/>
+              <a:endParaRPr lang="en-US"/>
+            </a:p>
+          </p:txBody>
+        </p:sp>
+        <p:sp>
+          <p:nvSpPr>
+            <p:cNvPr id="118" name="Oval 117"/>
+            <p:cNvSpPr/>
+            <p:nvPr/>
+          </p:nvSpPr>
+          <p:spPr>
+            <a:xfrm>
+              <a:off x="4448946" y="1880700"/>
+              <a:ext cx="118005" cy="115424"/>
+            </a:xfrm>
+            <a:prstGeom prst="ellipse">
+              <a:avLst/>
+            </a:prstGeom>
+            <a:solidFill>
+              <a:schemeClr val="accent4"/>
+            </a:solidFill>
+            <a:ln>
+              <a:solidFill>
+                <a:srgbClr val="000000"/>
+              </a:solidFill>
+            </a:ln>
+          </p:spPr>
+          <p:style>
+            <a:lnRef idx="1">
+              <a:schemeClr val="accent1"/>
+            </a:lnRef>
+            <a:fillRef idx="3">
+              <a:schemeClr val="accent1"/>
+            </a:fillRef>
+            <a:effectRef idx="2">
+              <a:schemeClr val="accent1"/>
+            </a:effectRef>
+            <a:fontRef idx="minor">
+              <a:schemeClr val="lt1"/>
+            </a:fontRef>
+          </p:style>
+          <p:txBody>
+            <a:bodyPr rtlCol="0" anchor="ctr"/>
+            <a:lstStyle/>
+            <a:p>
+              <a:pPr algn="ctr"/>
+              <a:endParaRPr lang="en-US"/>
+            </a:p>
+          </p:txBody>
+        </p:sp>
+        <p:sp>
+          <p:nvSpPr>
+            <p:cNvPr id="119" name="Oval 118"/>
+            <p:cNvSpPr/>
+            <p:nvPr/>
+          </p:nvSpPr>
+          <p:spPr>
+            <a:xfrm>
+              <a:off x="4330630" y="1936241"/>
+              <a:ext cx="118005" cy="115424"/>
+            </a:xfrm>
+            <a:prstGeom prst="ellipse">
+              <a:avLst/>
+            </a:prstGeom>
+            <a:solidFill>
+              <a:schemeClr val="bg1"/>
+            </a:solidFill>
+            <a:ln>
+              <a:solidFill>
+                <a:schemeClr val="tx1"/>
+              </a:solidFill>
+            </a:ln>
+          </p:spPr>
+          <p:style>
+            <a:lnRef idx="1">
+              <a:schemeClr val="accent1"/>
+            </a:lnRef>
+            <a:fillRef idx="3">
+              <a:schemeClr val="accent1"/>
+            </a:fillRef>
+            <a:effectRef idx="2">
+              <a:schemeClr val="accent1"/>
+            </a:effectRef>
+            <a:fontRef idx="minor">
+              <a:schemeClr val="lt1"/>
+            </a:fontRef>
+          </p:style>
+          <p:txBody>
+            <a:bodyPr rtlCol="0" anchor="ctr"/>
+            <a:lstStyle/>
+            <a:p>
+              <a:pPr algn="ctr"/>
+              <a:endParaRPr lang="en-US"/>
+            </a:p>
+          </p:txBody>
+        </p:sp>
+      </p:grpSp>
+      <p:grpSp>
+        <p:nvGrpSpPr>
+          <p:cNvPr id="126" name="Group 125"/>
+          <p:cNvGrpSpPr/>
+          <p:nvPr/>
+        </p:nvGrpSpPr>
+        <p:grpSpPr>
+          <a:xfrm>
+            <a:off x="4178230" y="2163406"/>
+            <a:ext cx="380237" cy="359525"/>
+            <a:chOff x="4998930" y="3248846"/>
+            <a:chExt cx="380237" cy="359525"/>
+          </a:xfrm>
+        </p:grpSpPr>
+        <p:sp>
+          <p:nvSpPr>
+            <p:cNvPr id="120" name="Oval 119"/>
+            <p:cNvSpPr/>
+            <p:nvPr/>
+          </p:nvSpPr>
+          <p:spPr>
+            <a:xfrm>
+              <a:off x="4998930" y="3248846"/>
+              <a:ext cx="380237" cy="359525"/>
+            </a:xfrm>
+            <a:prstGeom prst="ellipse">
+              <a:avLst/>
+            </a:prstGeom>
+            <a:solidFill>
+              <a:srgbClr val="A6A6A6"/>
+            </a:solidFill>
+            <a:ln>
+              <a:solidFill>
+                <a:schemeClr val="tx1"/>
+              </a:solidFill>
+            </a:ln>
+          </p:spPr>
+          <p:style>
+            <a:lnRef idx="1">
+              <a:schemeClr val="accent1"/>
+            </a:lnRef>
+            <a:fillRef idx="3">
+              <a:schemeClr val="accent1"/>
+            </a:fillRef>
+            <a:effectRef idx="2">
+              <a:schemeClr val="accent1"/>
+            </a:effectRef>
+            <a:fontRef idx="minor">
+              <a:schemeClr val="lt1"/>
+            </a:fontRef>
+          </p:style>
+          <p:txBody>
+            <a:bodyPr rtlCol="0" anchor="ctr"/>
+            <a:lstStyle/>
+            <a:p>
+              <a:pPr algn="ctr"/>
+              <a:endParaRPr lang="en-US"/>
+            </a:p>
+          </p:txBody>
+        </p:sp>
+        <p:sp>
+          <p:nvSpPr>
+            <p:cNvPr id="121" name="Oval 120"/>
+            <p:cNvSpPr/>
+            <p:nvPr/>
+          </p:nvSpPr>
+          <p:spPr>
+            <a:xfrm>
+              <a:off x="5238508" y="3337817"/>
+              <a:ext cx="118005" cy="115424"/>
+            </a:xfrm>
+            <a:prstGeom prst="ellipse">
+              <a:avLst/>
+            </a:prstGeom>
+            <a:solidFill>
+              <a:schemeClr val="tx2">
+                <a:lumMod val="40000"/>
+                <a:lumOff val="60000"/>
+              </a:schemeClr>
+            </a:solidFill>
+            <a:ln>
+              <a:solidFill>
+                <a:srgbClr val="000000"/>
+              </a:solidFill>
+            </a:ln>
+          </p:spPr>
+          <p:style>
+            <a:lnRef idx="1">
+              <a:schemeClr val="accent1"/>
+            </a:lnRef>
+            <a:fillRef idx="3">
+              <a:schemeClr val="accent1"/>
+            </a:fillRef>
+            <a:effectRef idx="2">
+              <a:schemeClr val="accent1"/>
+            </a:effectRef>
+            <a:fontRef idx="minor">
+              <a:schemeClr val="lt1"/>
+            </a:fontRef>
+          </p:style>
+          <p:txBody>
+            <a:bodyPr rtlCol="0" anchor="ctr"/>
+            <a:lstStyle/>
+            <a:p>
+              <a:pPr algn="ctr"/>
+              <a:endParaRPr lang="en-US"/>
+            </a:p>
+          </p:txBody>
+        </p:sp>
+        <p:sp>
+          <p:nvSpPr>
+            <p:cNvPr id="122" name="Oval 121"/>
+            <p:cNvSpPr/>
+            <p:nvPr/>
+          </p:nvSpPr>
+          <p:spPr>
+            <a:xfrm>
+              <a:off x="5191780" y="3451645"/>
+              <a:ext cx="118005" cy="115424"/>
+            </a:xfrm>
+            <a:prstGeom prst="ellipse">
+              <a:avLst/>
+            </a:prstGeom>
+            <a:solidFill>
+              <a:schemeClr val="accent6"/>
+            </a:solidFill>
+            <a:ln>
+              <a:solidFill>
+                <a:srgbClr val="000000"/>
+              </a:solidFill>
+            </a:ln>
+          </p:spPr>
+          <p:style>
+            <a:lnRef idx="1">
+              <a:schemeClr val="accent1"/>
+            </a:lnRef>
+            <a:fillRef idx="3">
+              <a:schemeClr val="accent1"/>
+            </a:fillRef>
+            <a:effectRef idx="2">
+              <a:schemeClr val="accent1"/>
+            </a:effectRef>
+            <a:fontRef idx="minor">
+              <a:schemeClr val="lt1"/>
+            </a:fontRef>
+          </p:style>
+          <p:txBody>
+            <a:bodyPr rtlCol="0" anchor="ctr"/>
+            <a:lstStyle/>
+            <a:p>
+              <a:pPr algn="ctr"/>
+              <a:endParaRPr lang="en-US"/>
+            </a:p>
+          </p:txBody>
+        </p:sp>
+        <p:sp>
+          <p:nvSpPr>
+            <p:cNvPr id="123" name="Oval 122"/>
+            <p:cNvSpPr/>
+            <p:nvPr/>
+          </p:nvSpPr>
+          <p:spPr>
+            <a:xfrm>
+              <a:off x="5142675" y="3254939"/>
+              <a:ext cx="118005" cy="115424"/>
+            </a:xfrm>
+            <a:prstGeom prst="ellipse">
+              <a:avLst/>
+            </a:prstGeom>
+            <a:solidFill>
+              <a:schemeClr val="accent2"/>
+            </a:solidFill>
+            <a:ln>
+              <a:solidFill>
+                <a:srgbClr val="000000"/>
+              </a:solidFill>
+            </a:ln>
+          </p:spPr>
+          <p:style>
+            <a:lnRef idx="1">
+              <a:schemeClr val="accent1"/>
+            </a:lnRef>
+            <a:fillRef idx="3">
+              <a:schemeClr val="accent1"/>
+            </a:fillRef>
+            <a:effectRef idx="2">
+              <a:schemeClr val="accent1"/>
+            </a:effectRef>
+            <a:fontRef idx="minor">
+              <a:schemeClr val="lt1"/>
+            </a:fontRef>
+          </p:style>
+          <p:txBody>
+            <a:bodyPr rtlCol="0" anchor="ctr"/>
+            <a:lstStyle/>
+            <a:p>
+              <a:pPr algn="ctr"/>
+              <a:endParaRPr lang="en-US"/>
+            </a:p>
+          </p:txBody>
+        </p:sp>
+        <p:sp>
+          <p:nvSpPr>
+            <p:cNvPr id="124" name="Oval 123"/>
+            <p:cNvSpPr/>
+            <p:nvPr/>
+          </p:nvSpPr>
+          <p:spPr>
+            <a:xfrm>
+              <a:off x="5055419" y="3450202"/>
+              <a:ext cx="118005" cy="115424"/>
+            </a:xfrm>
+            <a:prstGeom prst="ellipse">
+              <a:avLst/>
+            </a:prstGeom>
+            <a:solidFill>
+              <a:schemeClr val="bg2">
+                <a:lumMod val="50000"/>
+              </a:schemeClr>
+            </a:solidFill>
+            <a:ln>
+              <a:solidFill>
+                <a:srgbClr val="000000"/>
+              </a:solidFill>
+            </a:ln>
+          </p:spPr>
+          <p:style>
+            <a:lnRef idx="1">
+              <a:schemeClr val="accent1"/>
+            </a:lnRef>
+            <a:fillRef idx="3">
+              <a:schemeClr val="accent1"/>
+            </a:fillRef>
+            <a:effectRef idx="2">
+              <a:schemeClr val="accent1"/>
+            </a:effectRef>
+            <a:fontRef idx="minor">
+              <a:schemeClr val="lt1"/>
+            </a:fontRef>
+          </p:style>
+          <p:txBody>
+            <a:bodyPr rtlCol="0" anchor="ctr"/>
+            <a:lstStyle/>
+            <a:p>
+              <a:pPr algn="ctr"/>
+              <a:endParaRPr lang="en-US"/>
+            </a:p>
+          </p:txBody>
+        </p:sp>
+        <p:sp>
+          <p:nvSpPr>
+            <p:cNvPr id="125" name="Oval 124"/>
+            <p:cNvSpPr/>
+            <p:nvPr/>
+          </p:nvSpPr>
+          <p:spPr>
+            <a:xfrm>
+              <a:off x="5024359" y="3310480"/>
+              <a:ext cx="118005" cy="115424"/>
+            </a:xfrm>
+            <a:prstGeom prst="ellipse">
+              <a:avLst/>
+            </a:prstGeom>
+            <a:solidFill>
+              <a:schemeClr val="bg1"/>
+            </a:solidFill>
+            <a:ln>
+              <a:solidFill>
+                <a:schemeClr val="tx1"/>
+              </a:solidFill>
+            </a:ln>
+          </p:spPr>
+          <p:style>
+            <a:lnRef idx="1">
+              <a:schemeClr val="accent1"/>
+            </a:lnRef>
+            <a:fillRef idx="3">
+              <a:schemeClr val="accent1"/>
+            </a:fillRef>
+            <a:effectRef idx="2">
+              <a:schemeClr val="accent1"/>
+            </a:effectRef>
+            <a:fontRef idx="minor">
+              <a:schemeClr val="lt1"/>
+            </a:fontRef>
+          </p:style>
+          <p:txBody>
+            <a:bodyPr rtlCol="0" anchor="ctr"/>
+            <a:lstStyle/>
+            <a:p>
+              <a:pPr algn="ctr"/>
+              <a:endParaRPr lang="en-US"/>
+            </a:p>
+          </p:txBody>
+        </p:sp>
+      </p:grpSp>
+      <p:grpSp>
+        <p:nvGrpSpPr>
+          <p:cNvPr id="133" name="Group 132"/>
+          <p:cNvGrpSpPr/>
+          <p:nvPr/>
+        </p:nvGrpSpPr>
+        <p:grpSpPr>
+          <a:xfrm>
+            <a:off x="5091282" y="2045277"/>
+            <a:ext cx="380237" cy="359525"/>
+            <a:chOff x="4998930" y="3248846"/>
+            <a:chExt cx="380237" cy="359525"/>
+          </a:xfrm>
+        </p:grpSpPr>
+        <p:sp>
+          <p:nvSpPr>
+            <p:cNvPr id="127" name="Oval 126"/>
+            <p:cNvSpPr/>
+            <p:nvPr/>
+          </p:nvSpPr>
+          <p:spPr>
+            <a:xfrm>
+              <a:off x="4998930" y="3248846"/>
+              <a:ext cx="380237" cy="359525"/>
+            </a:xfrm>
+            <a:prstGeom prst="ellipse">
+              <a:avLst/>
+            </a:prstGeom>
+            <a:solidFill>
+              <a:srgbClr val="A6A6A6"/>
+            </a:solidFill>
+            <a:ln>
+              <a:solidFill>
+                <a:schemeClr val="tx1"/>
+              </a:solidFill>
+            </a:ln>
+          </p:spPr>
+          <p:style>
+            <a:lnRef idx="1">
+              <a:schemeClr val="accent1"/>
+            </a:lnRef>
+            <a:fillRef idx="3">
+              <a:schemeClr val="accent1"/>
+            </a:fillRef>
+            <a:effectRef idx="2">
+              <a:schemeClr val="accent1"/>
+            </a:effectRef>
+            <a:fontRef idx="minor">
+              <a:schemeClr val="lt1"/>
+            </a:fontRef>
+          </p:style>
+          <p:txBody>
+            <a:bodyPr rtlCol="0" anchor="ctr"/>
+            <a:lstStyle/>
+            <a:p>
+              <a:pPr algn="ctr"/>
+              <a:endParaRPr lang="en-US"/>
+            </a:p>
+          </p:txBody>
+        </p:sp>
+        <p:sp>
+          <p:nvSpPr>
+            <p:cNvPr id="128" name="Oval 127"/>
+            <p:cNvSpPr/>
+            <p:nvPr/>
+          </p:nvSpPr>
+          <p:spPr>
+            <a:xfrm>
+              <a:off x="5238508" y="3337817"/>
+              <a:ext cx="118005" cy="115424"/>
+            </a:xfrm>
+            <a:prstGeom prst="ellipse">
+              <a:avLst/>
+            </a:prstGeom>
+            <a:solidFill>
+              <a:schemeClr val="tx2">
+                <a:lumMod val="40000"/>
+                <a:lumOff val="60000"/>
+              </a:schemeClr>
+            </a:solidFill>
+            <a:ln>
+              <a:solidFill>
+                <a:srgbClr val="000000"/>
+              </a:solidFill>
+            </a:ln>
+          </p:spPr>
+          <p:style>
+            <a:lnRef idx="1">
+              <a:schemeClr val="accent1"/>
+            </a:lnRef>
+            <a:fillRef idx="3">
+              <a:schemeClr val="accent1"/>
+            </a:fillRef>
+            <a:effectRef idx="2">
+              <a:schemeClr val="accent1"/>
+            </a:effectRef>
+            <a:fontRef idx="minor">
+              <a:schemeClr val="lt1"/>
+            </a:fontRef>
+          </p:style>
+          <p:txBody>
+            <a:bodyPr rtlCol="0" anchor="ctr"/>
+            <a:lstStyle/>
+            <a:p>
+              <a:pPr algn="ctr"/>
+              <a:endParaRPr lang="en-US"/>
+            </a:p>
+          </p:txBody>
+        </p:sp>
+        <p:sp>
+          <p:nvSpPr>
+            <p:cNvPr id="129" name="Oval 128"/>
+            <p:cNvSpPr/>
+            <p:nvPr/>
+          </p:nvSpPr>
+          <p:spPr>
+            <a:xfrm>
+              <a:off x="5191780" y="3451645"/>
+              <a:ext cx="118005" cy="115424"/>
+            </a:xfrm>
+            <a:prstGeom prst="ellipse">
+              <a:avLst/>
+            </a:prstGeom>
+            <a:solidFill>
+              <a:schemeClr val="accent6"/>
+            </a:solidFill>
+            <a:ln>
+              <a:solidFill>
+                <a:srgbClr val="000000"/>
+              </a:solidFill>
+            </a:ln>
+          </p:spPr>
+          <p:style>
+            <a:lnRef idx="1">
+              <a:schemeClr val="accent1"/>
+            </a:lnRef>
+            <a:fillRef idx="3">
+              <a:schemeClr val="accent1"/>
+            </a:fillRef>
+            <a:effectRef idx="2">
+              <a:schemeClr val="accent1"/>
+            </a:effectRef>
+            <a:fontRef idx="minor">
+              <a:schemeClr val="lt1"/>
+            </a:fontRef>
+          </p:style>
+          <p:txBody>
+            <a:bodyPr rtlCol="0" anchor="ctr"/>
+            <a:lstStyle/>
+            <a:p>
+              <a:pPr algn="ctr"/>
+              <a:endParaRPr lang="en-US"/>
+            </a:p>
+          </p:txBody>
+        </p:sp>
+        <p:sp>
+          <p:nvSpPr>
+            <p:cNvPr id="130" name="Oval 129"/>
+            <p:cNvSpPr/>
+            <p:nvPr/>
+          </p:nvSpPr>
+          <p:spPr>
+            <a:xfrm>
+              <a:off x="5142675" y="3254939"/>
+              <a:ext cx="118005" cy="115424"/>
+            </a:xfrm>
+            <a:prstGeom prst="ellipse">
+              <a:avLst/>
+            </a:prstGeom>
+            <a:solidFill>
+              <a:schemeClr val="accent2"/>
+            </a:solidFill>
+            <a:ln>
+              <a:solidFill>
+                <a:srgbClr val="000000"/>
+              </a:solidFill>
+            </a:ln>
+          </p:spPr>
+          <p:style>
+            <a:lnRef idx="1">
+              <a:schemeClr val="accent1"/>
+            </a:lnRef>
+            <a:fillRef idx="3">
+              <a:schemeClr val="accent1"/>
+            </a:fillRef>
+            <a:effectRef idx="2">
+              <a:schemeClr val="accent1"/>
+            </a:effectRef>
+            <a:fontRef idx="minor">
+              <a:schemeClr val="lt1"/>
+            </a:fontRef>
+          </p:style>
+          <p:txBody>
+            <a:bodyPr rtlCol="0" anchor="ctr"/>
+            <a:lstStyle/>
+            <a:p>
+              <a:pPr algn="ctr"/>
+              <a:endParaRPr lang="en-US"/>
+            </a:p>
+          </p:txBody>
+        </p:sp>
+        <p:sp>
+          <p:nvSpPr>
+            <p:cNvPr id="131" name="Oval 130"/>
+            <p:cNvSpPr/>
+            <p:nvPr/>
+          </p:nvSpPr>
+          <p:spPr>
+            <a:xfrm>
+              <a:off x="5055419" y="3450202"/>
+              <a:ext cx="118005" cy="115424"/>
+            </a:xfrm>
+            <a:prstGeom prst="ellipse">
+              <a:avLst/>
+            </a:prstGeom>
+            <a:solidFill>
+              <a:schemeClr val="bg2">
+                <a:lumMod val="50000"/>
+              </a:schemeClr>
+            </a:solidFill>
+            <a:ln>
+              <a:solidFill>
+                <a:srgbClr val="000000"/>
+              </a:solidFill>
+            </a:ln>
+          </p:spPr>
+          <p:style>
+            <a:lnRef idx="1">
+              <a:schemeClr val="accent1"/>
+            </a:lnRef>
+            <a:fillRef idx="3">
+              <a:schemeClr val="accent1"/>
+            </a:fillRef>
+            <a:effectRef idx="2">
+              <a:schemeClr val="accent1"/>
+            </a:effectRef>
+            <a:fontRef idx="minor">
+              <a:schemeClr val="lt1"/>
+            </a:fontRef>
+          </p:style>
+          <p:txBody>
+            <a:bodyPr rtlCol="0" anchor="ctr"/>
+            <a:lstStyle/>
+            <a:p>
+              <a:pPr algn="ctr"/>
+              <a:endParaRPr lang="en-US"/>
+            </a:p>
+          </p:txBody>
+        </p:sp>
+        <p:sp>
+          <p:nvSpPr>
+            <p:cNvPr id="132" name="Oval 131"/>
+            <p:cNvSpPr/>
+            <p:nvPr/>
+          </p:nvSpPr>
+          <p:spPr>
+            <a:xfrm>
+              <a:off x="5024359" y="3310480"/>
+              <a:ext cx="118005" cy="115424"/>
+            </a:xfrm>
+            <a:prstGeom prst="ellipse">
+              <a:avLst/>
+            </a:prstGeom>
+            <a:solidFill>
+              <a:schemeClr val="bg1"/>
             </a:solidFill>
             <a:ln>
               <a:solidFill>

</xml_diff>